<commit_message>
uploaded first review ppt
</commit_message>
<xml_diff>
--- a/Python Mid Project Review.pptx
+++ b/Python Mid Project Review.pptx
@@ -3754,7 +3754,7 @@
           <a:p>
             <a:fld id="{10AD5049-B4DA-4B2A-84D1-6202C1810258}" type="datetimeFigureOut">
               <a:rPr lang="en-IN" smtClean="0"/>
-              <a:t>21-08-2025</a:t>
+              <a:t>22-08-2025</a:t>
             </a:fld>
             <a:endParaRPr lang="en-IN"/>
           </a:p>
@@ -3964,7 +3964,7 @@
           <a:p>
             <a:fld id="{10AD5049-B4DA-4B2A-84D1-6202C1810258}" type="datetimeFigureOut">
               <a:rPr lang="en-IN" smtClean="0"/>
-              <a:t>21-08-2025</a:t>
+              <a:t>22-08-2025</a:t>
             </a:fld>
             <a:endParaRPr lang="en-IN"/>
           </a:p>
@@ -4184,7 +4184,7 @@
           <a:p>
             <a:fld id="{10AD5049-B4DA-4B2A-84D1-6202C1810258}" type="datetimeFigureOut">
               <a:rPr lang="en-IN" smtClean="0"/>
-              <a:t>21-08-2025</a:t>
+              <a:t>22-08-2025</a:t>
             </a:fld>
             <a:endParaRPr lang="en-IN"/>
           </a:p>
@@ -4394,7 +4394,7 @@
           <a:p>
             <a:fld id="{10AD5049-B4DA-4B2A-84D1-6202C1810258}" type="datetimeFigureOut">
               <a:rPr lang="en-IN" smtClean="0"/>
-              <a:t>21-08-2025</a:t>
+              <a:t>22-08-2025</a:t>
             </a:fld>
             <a:endParaRPr lang="en-IN"/>
           </a:p>
@@ -4680,7 +4680,7 @@
           <a:p>
             <a:fld id="{10AD5049-B4DA-4B2A-84D1-6202C1810258}" type="datetimeFigureOut">
               <a:rPr lang="en-IN" smtClean="0"/>
-              <a:t>21-08-2025</a:t>
+              <a:t>22-08-2025</a:t>
             </a:fld>
             <a:endParaRPr lang="en-IN"/>
           </a:p>
@@ -4958,7 +4958,7 @@
           <a:p>
             <a:fld id="{10AD5049-B4DA-4B2A-84D1-6202C1810258}" type="datetimeFigureOut">
               <a:rPr lang="en-IN" smtClean="0"/>
-              <a:t>21-08-2025</a:t>
+              <a:t>22-08-2025</a:t>
             </a:fld>
             <a:endParaRPr lang="en-IN"/>
           </a:p>
@@ -5383,7 +5383,7 @@
           <a:p>
             <a:fld id="{10AD5049-B4DA-4B2A-84D1-6202C1810258}" type="datetimeFigureOut">
               <a:rPr lang="en-IN" smtClean="0"/>
-              <a:t>21-08-2025</a:t>
+              <a:t>22-08-2025</a:t>
             </a:fld>
             <a:endParaRPr lang="en-IN"/>
           </a:p>
@@ -5535,7 +5535,7 @@
           <a:p>
             <a:fld id="{10AD5049-B4DA-4B2A-84D1-6202C1810258}" type="datetimeFigureOut">
               <a:rPr lang="en-IN" smtClean="0"/>
-              <a:t>21-08-2025</a:t>
+              <a:t>22-08-2025</a:t>
             </a:fld>
             <a:endParaRPr lang="en-IN"/>
           </a:p>
@@ -5658,7 +5658,7 @@
           <a:p>
             <a:fld id="{10AD5049-B4DA-4B2A-84D1-6202C1810258}" type="datetimeFigureOut">
               <a:rPr lang="en-IN" smtClean="0"/>
-              <a:t>21-08-2025</a:t>
+              <a:t>22-08-2025</a:t>
             </a:fld>
             <a:endParaRPr lang="en-IN"/>
           </a:p>
@@ -5980,7 +5980,7 @@
           <a:p>
             <a:fld id="{10AD5049-B4DA-4B2A-84D1-6202C1810258}" type="datetimeFigureOut">
               <a:rPr lang="en-IN" smtClean="0"/>
-              <a:t>21-08-2025</a:t>
+              <a:t>22-08-2025</a:t>
             </a:fld>
             <a:endParaRPr lang="en-IN"/>
           </a:p>
@@ -6279,7 +6279,7 @@
           <a:p>
             <a:fld id="{10AD5049-B4DA-4B2A-84D1-6202C1810258}" type="datetimeFigureOut">
               <a:rPr lang="en-IN" smtClean="0"/>
-              <a:t>21-08-2025</a:t>
+              <a:t>22-08-2025</a:t>
             </a:fld>
             <a:endParaRPr lang="en-IN"/>
           </a:p>
@@ -6532,7 +6532,7 @@
           <a:p>
             <a:fld id="{10AD5049-B4DA-4B2A-84D1-6202C1810258}" type="datetimeFigureOut">
               <a:rPr lang="en-IN" smtClean="0"/>
-              <a:t>21-08-2025</a:t>
+              <a:t>22-08-2025</a:t>
             </a:fld>
             <a:endParaRPr lang="en-IN"/>
           </a:p>
@@ -7329,7 +7329,7 @@
         </p:nvSpPr>
         <p:spPr>
           <a:xfrm>
-            <a:off x="6067927" y="3231273"/>
+            <a:off x="6065712" y="3148257"/>
             <a:ext cx="2989731" cy="1572418"/>
           </a:xfrm>
           <a:prstGeom prst="rect">
@@ -7349,7 +7349,7 @@
               </a:lnSpc>
             </a:pPr>
             <a:r>
-              <a:rPr lang="en-US" sz="1400" b="1">
+              <a:rPr lang="en-US" sz="1400" b="1" dirty="0">
                 <a:solidFill>
                   <a:srgbClr val="A5CEDE"/>
                 </a:solidFill>
@@ -7359,7 +7359,7 @@
               </a:rPr>
               <a:t>TEAM C-7</a:t>
             </a:r>
-            <a:endParaRPr lang="en-US" sz="1400" b="1">
+            <a:endParaRPr lang="en-US" sz="1400" b="1" dirty="0">
               <a:solidFill>
                 <a:srgbClr val="A5CEDE"/>
               </a:solidFill>
@@ -7375,7 +7375,7 @@
               </a:lnSpc>
             </a:pPr>
             <a:r>
-              <a:rPr lang="en-US" sz="1400" b="1">
+              <a:rPr lang="en-US" sz="1400" b="1" dirty="0">
                 <a:solidFill>
                   <a:srgbClr val="A5CEDE"/>
                 </a:solidFill>
@@ -7385,7 +7385,7 @@
               </a:rPr>
               <a:t>G PRAJWAL PRIYADARSHAN (24214)</a:t>
             </a:r>
-            <a:endParaRPr lang="en-US" sz="1400" b="1">
+            <a:endParaRPr lang="en-US" sz="1400" b="1" dirty="0">
               <a:solidFill>
                 <a:srgbClr val="A5CEDE"/>
               </a:solidFill>
@@ -7400,7 +7400,7 @@
               </a:lnSpc>
             </a:pPr>
             <a:r>
-              <a:rPr lang="en-US" sz="1400" b="1">
+              <a:rPr lang="en-US" sz="1400" b="1" dirty="0">
                 <a:solidFill>
                   <a:srgbClr val="A5CEDE"/>
                 </a:solidFill>
@@ -7410,7 +7410,7 @@
               </a:rPr>
               <a:t>KABILAN K (24224)</a:t>
             </a:r>
-            <a:endParaRPr lang="en-US" sz="1400" b="1">
+            <a:endParaRPr lang="en-US" sz="1400" b="1" dirty="0">
               <a:solidFill>
                 <a:srgbClr val="A5CEDE"/>
               </a:solidFill>
@@ -7426,7 +7426,7 @@
               </a:lnSpc>
             </a:pPr>
             <a:r>
-              <a:rPr lang="en-US" sz="1400" b="1">
+              <a:rPr lang="en-US" sz="1400" b="1" dirty="0">
                 <a:solidFill>
                   <a:srgbClr val="A5CEDE"/>
                 </a:solidFill>
@@ -7436,7 +7436,7 @@
               </a:rPr>
               <a:t>KISHORE B (24227)</a:t>
             </a:r>
-            <a:endParaRPr lang="en-US" sz="1400" b="1">
+            <a:endParaRPr lang="en-US" sz="1400" b="1" dirty="0">
               <a:solidFill>
                 <a:srgbClr val="A5CEDE"/>
               </a:solidFill>
@@ -7452,7 +7452,7 @@
               </a:lnSpc>
             </a:pPr>
             <a:r>
-              <a:rPr lang="en-US" sz="1400" b="1">
+              <a:rPr lang="en-US" sz="1400" b="1" dirty="0">
                 <a:solidFill>
                   <a:srgbClr val="A5CEDE"/>
                 </a:solidFill>
@@ -7462,7 +7462,7 @@
               </a:rPr>
               <a:t>RAHUL L S (24248)</a:t>
             </a:r>
-            <a:endParaRPr lang="en-US" sz="1400" b="1">
+            <a:endParaRPr lang="en-US" sz="1400" b="1" dirty="0">
               <a:solidFill>
                 <a:srgbClr val="A5CEDE"/>
               </a:solidFill>
@@ -14869,20 +14869,20 @@
 </file>
 
 <file path=customXml/item2.xml><?xml version="1.0" encoding="utf-8"?>
+<p:properties xmlns:p="http://schemas.microsoft.com/office/2006/metadata/properties" xmlns:xsi="http://www.w3.org/2001/XMLSchema-instance" xmlns:pc="http://schemas.microsoft.com/office/infopath/2007/PartnerControls">
+  <documentManagement>
+    <_activity xmlns="9cc30c9d-470f-4184-8cf6-3de8178a07b2" xsi:nil="true"/>
+  </documentManagement>
+</p:properties>
+</file>
+
+<file path=customXml/item3.xml><?xml version="1.0" encoding="utf-8"?>
 <?mso-contentType ?>
 <FormTemplates xmlns="http://schemas.microsoft.com/sharepoint/v3/contenttype/forms">
   <Display>DocumentLibraryForm</Display>
   <Edit>DocumentLibraryForm</Edit>
   <New>DocumentLibraryForm</New>
 </FormTemplates>
-</file>
-
-<file path=customXml/item3.xml><?xml version="1.0" encoding="utf-8"?>
-<p:properties xmlns:p="http://schemas.microsoft.com/office/2006/metadata/properties" xmlns:xsi="http://www.w3.org/2001/XMLSchema-instance" xmlns:pc="http://schemas.microsoft.com/office/infopath/2007/PartnerControls">
-  <documentManagement>
-    <_activity xmlns="9cc30c9d-470f-4184-8cf6-3de8178a07b2" xsi:nil="true"/>
-  </documentManagement>
-</p:properties>
 </file>
 
 <file path=customXml/itemProps1.xml><?xml version="1.0" encoding="utf-8"?>
@@ -14904,14 +14904,6 @@
 </file>
 
 <file path=customXml/itemProps2.xml><?xml version="1.0" encoding="utf-8"?>
-<ds:datastoreItem xmlns:ds="http://schemas.openxmlformats.org/officeDocument/2006/customXml" ds:itemID="{D0C0A18D-CB17-445B-825E-A5895AD3083A}">
-  <ds:schemaRefs>
-    <ds:schemaRef ds:uri="http://schemas.microsoft.com/sharepoint/v3/contenttype/forms"/>
-  </ds:schemaRefs>
-</ds:datastoreItem>
-</file>
-
-<file path=customXml/itemProps3.xml><?xml version="1.0" encoding="utf-8"?>
 <ds:datastoreItem xmlns:ds="http://schemas.openxmlformats.org/officeDocument/2006/customXml" ds:itemID="{3A904A71-F461-45D7-AD2F-198FB18A4170}">
   <ds:schemaRefs>
     <ds:schemaRef ds:uri="9cc30c9d-470f-4184-8cf6-3de8178a07b2"/>
@@ -14925,4 +14917,12 @@
     <ds:schemaRef ds:uri="http://www.w3.org/XML/1998/namespace"/>
   </ds:schemaRefs>
 </ds:datastoreItem>
+</file>
+
+<file path=customXml/itemProps3.xml><?xml version="1.0" encoding="utf-8"?>
+<ds:datastoreItem xmlns:ds="http://schemas.openxmlformats.org/officeDocument/2006/customXml" ds:itemID="{D0C0A18D-CB17-445B-825E-A5895AD3083A}">
+  <ds:schemaRefs>
+    <ds:schemaRef ds:uri="http://schemas.microsoft.com/sharepoint/v3/contenttype/forms"/>
+  </ds:schemaRefs>
+</ds:datastoreItem>
 </file>
</xml_diff>